<commit_message>
PPT NEW is final!!!!
</commit_message>
<xml_diff>
--- a/documentation/FinalPresentation_UncannyValleyNew.pptx
+++ b/documentation/FinalPresentation_UncannyValleyNew.pptx
@@ -8836,9 +8836,19 @@
             <a:pPr marL="0" indent="0">
               <a:buNone/>
             </a:pPr>
+            <a:endParaRPr lang="en-US" dirty="0" smtClean="0"/>
+          </a:p>
+          <a:p>
+            <a:pPr marL="0" indent="0">
+              <a:buNone/>
+            </a:pPr>
             <a:r>
               <a:rPr lang="en-US" dirty="0" smtClean="0"/>
-              <a:t>For every pixel value </a:t>
+              <a:t>For </a:t>
+            </a:r>
+            <a:r>
+              <a:rPr lang="en-US" dirty="0" smtClean="0"/>
+              <a:t>every pixel value </a:t>
             </a:r>
           </a:p>
           <a:p>
@@ -8865,13 +8875,8 @@
             </a:pPr>
             <a:r>
               <a:rPr lang="en-US" dirty="0" smtClean="0"/>
-              <a:t>- Calculate the point on the ray using the rays parametric </a:t>
-            </a:r>
-            <a:r>
-              <a:rPr lang="en-US" dirty="0" smtClean="0"/>
-              <a:t>equation</a:t>
-            </a:r>
-            <a:endParaRPr lang="en-US" dirty="0" smtClean="0"/>
+              <a:t>- Calculate the point on the ray using the rays parametric equation</a:t>
+            </a:r>
           </a:p>
         </p:txBody>
       </p:sp>
@@ -9877,7 +9882,7 @@
   <a:extraClrSchemeLst/>
   <a:extLst>
     <a:ext uri="{05A4C25C-085E-4340-85A3-A5531E510DB2}">
-      <thm15:themeFamily xmlns="" xmlns:thm15="http://schemas.microsoft.com/office/thememl/2012/main" name="Office Theme" id="{62F939B6-93AF-4DB8-9C6B-D6C7DFDC589F}" vid="{4A3C46E8-61CC-4603-A589-7422A47A8E4A}"/>
+      <thm15:themeFamily xmlns:thm15="http://schemas.microsoft.com/office/thememl/2012/main" xmlns="" name="Office Theme" id="{62F939B6-93AF-4DB8-9C6B-D6C7DFDC589F}" vid="{4A3C46E8-61CC-4603-A589-7422A47A8E4A}"/>
     </a:ext>
   </a:extLst>
 </a:theme>

</xml_diff>